<commit_message>
Adding images used in documentation and necessary changes
</commit_message>
<xml_diff>
--- a/source/Samples/NeoCortexApiSample/Documentations/ML2425-01_Investigate_Image_Reconstruction_by_using_Classifiers_CodeWizards-Project_Presentation.pptx
+++ b/source/Samples/NeoCortexApiSample/Documentations/ML2425-01_Investigate_Image_Reconstruction_by_using_Classifiers_CodeWizards-Project_Presentation.pptx
@@ -7649,8 +7649,8 @@
         </p:nvSpPr>
         <p:spPr>
           <a:xfrm>
-            <a:off x="1318" y="1143755"/>
-            <a:ext cx="9213666" cy="1010370"/>
+            <a:off x="0" y="976393"/>
+            <a:ext cx="9144000" cy="1177732"/>
           </a:xfrm>
           <a:prstGeom prst="rect">
             <a:avLst/>
@@ -7682,7 +7682,7 @@
                 <a:ea typeface="Times New Roman"/>
                 <a:cs typeface="Times New Roman"/>
               </a:rPr>
-              <a:t>Below figures represents the visualization of similarity between HTM Reconstructed V/s Original Binarized Images.</a:t>
+              <a:t>Below figures represents the visualization of similarity between HTM Reconstructed V/s Original Binarized Images</a:t>
             </a:r>
             <a:endParaRPr lang="en-US" sz="1400" dirty="0">
               <a:solidFill>
@@ -7801,8 +7801,8 @@
         </p:blipFill>
         <p:spPr>
           <a:xfrm>
-            <a:off x="5333155" y="2266294"/>
-            <a:ext cx="2857551" cy="2630877"/>
+            <a:off x="4881968" y="2271219"/>
+            <a:ext cx="3549110" cy="2765730"/>
           </a:xfrm>
           <a:prstGeom prst="rect">
             <a:avLst/>
@@ -7830,8 +7830,8 @@
         </p:blipFill>
         <p:spPr>
           <a:xfrm>
-            <a:off x="1357636" y="2268756"/>
-            <a:ext cx="3078584" cy="2628414"/>
+            <a:off x="600527" y="2271219"/>
+            <a:ext cx="3746748" cy="2765730"/>
           </a:xfrm>
           <a:prstGeom prst="rect">
             <a:avLst/>
@@ -7922,8 +7922,8 @@
         </p:nvSpPr>
         <p:spPr>
           <a:xfrm>
-            <a:off x="4174" y="1020895"/>
-            <a:ext cx="9395991" cy="1138743"/>
+            <a:off x="1" y="852406"/>
+            <a:ext cx="9144000" cy="1138743"/>
           </a:xfrm>
           <a:prstGeom prst="rect">
             <a:avLst/>
@@ -7941,58 +7941,50 @@
           </a:bodyPr>
           <a:lstStyle/>
           <a:p>
-            <a:pPr>
+            <a:pPr marL="0" indent="0">
               <a:lnSpc>
                 <a:spcPct val="150000"/>
               </a:lnSpc>
               <a:spcBef>
                 <a:spcPts val="1200"/>
               </a:spcBef>
+              <a:buNone/>
             </a:pPr>
             <a:r>
-              <a:rPr lang="en" dirty="0">
+              <a:rPr lang="en" sz="1400" dirty="0">
                 <a:solidFill>
                   <a:schemeClr val="dk1"/>
                 </a:solidFill>
                 <a:ea typeface="Times New Roman"/>
                 <a:cs typeface="Times New Roman"/>
               </a:rPr>
-              <a:t>Below figures represents the visualization of similarity between KNN Reconstructed V/s Original Binarized Images.</a:t>
+              <a:t>Below figures represents the visualization of similarity between KNN Reconstructed V/s Original Binarized Images</a:t>
             </a:r>
-            <a:endParaRPr lang="en-US">
+            <a:endParaRPr lang="en-US" sz="1400" dirty="0">
               <a:solidFill>
                 <a:schemeClr val="dk1"/>
               </a:solidFill>
-              <a:ea typeface="Times New Roman"/>
-              <a:cs typeface="Times New Roman"/>
             </a:endParaRPr>
           </a:p>
           <a:p>
-            <a:pPr>
+            <a:pPr marL="0" indent="0">
               <a:lnSpc>
                 <a:spcPct val="150000"/>
               </a:lnSpc>
               <a:spcBef>
                 <a:spcPts val="1200"/>
               </a:spcBef>
+              <a:buNone/>
             </a:pPr>
             <a:r>
-              <a:rPr lang="en" dirty="0">
+              <a:rPr lang="en" sz="1400" dirty="0">
                 <a:solidFill>
                   <a:schemeClr val="dk1"/>
                 </a:solidFill>
-                <a:ea typeface="Times New Roman"/>
                 <a:cs typeface="Times New Roman"/>
               </a:rPr>
               <a:t>The Bar Graph is plotted with Jaccard Index Similarity and the Scott Plot is using Hamming Distance Similarity.</a:t>
             </a:r>
-            <a:endParaRPr lang="en-US">
-              <a:solidFill>
-                <a:schemeClr val="dk1"/>
-              </a:solidFill>
-              <a:ea typeface="Times New Roman"/>
-              <a:cs typeface="Times New Roman"/>
-            </a:endParaRPr>
           </a:p>
         </p:txBody>
       </p:sp>
@@ -8017,8 +8009,8 @@
         </p:blipFill>
         <p:spPr>
           <a:xfrm>
-            <a:off x="877083" y="2133271"/>
-            <a:ext cx="3128622" cy="2699538"/>
+            <a:off x="666427" y="2092271"/>
+            <a:ext cx="3642101" cy="2857499"/>
           </a:xfrm>
           <a:prstGeom prst="rect">
             <a:avLst/>
@@ -8046,8 +8038,8 @@
         </p:blipFill>
         <p:spPr>
           <a:xfrm>
-            <a:off x="4572613" y="2124053"/>
-            <a:ext cx="3688392" cy="2709070"/>
+            <a:off x="4572000" y="2092271"/>
+            <a:ext cx="3742841" cy="2857499"/>
           </a:xfrm>
           <a:prstGeom prst="rect">
             <a:avLst/>
@@ -8593,7 +8585,7 @@
               </a:rPr>
               <a:t>Problem Statement</a:t>
             </a:r>
-            <a:endParaRPr lang="en-US" sz="1800">
+            <a:endParaRPr lang="en-US" sz="1800" dirty="0">
               <a:solidFill>
                 <a:schemeClr val="dk1"/>
               </a:solidFill>
@@ -8627,7 +8619,7 @@
               </a:rPr>
               <a:t>Introduction</a:t>
             </a:r>
-            <a:endParaRPr sz="1800">
+            <a:endParaRPr sz="1800" dirty="0">
               <a:solidFill>
                 <a:schemeClr val="dk1"/>
               </a:solidFill>
@@ -8661,7 +8653,7 @@
               </a:rPr>
               <a:t>Methodology</a:t>
             </a:r>
-            <a:endParaRPr sz="1800">
+            <a:endParaRPr sz="1800" dirty="0">
               <a:solidFill>
                 <a:schemeClr val="dk1"/>
               </a:solidFill>
@@ -8695,7 +8687,7 @@
               </a:rPr>
               <a:t>Experiment</a:t>
             </a:r>
-            <a:endParaRPr sz="1800">
+            <a:endParaRPr sz="1800" dirty="0">
               <a:solidFill>
                 <a:schemeClr val="dk1"/>
               </a:solidFill>
@@ -8729,7 +8721,7 @@
               </a:rPr>
               <a:t>Result</a:t>
             </a:r>
-            <a:endParaRPr sz="1800">
+            <a:endParaRPr sz="1800" dirty="0">
               <a:solidFill>
                 <a:schemeClr val="dk1"/>
               </a:solidFill>
@@ -8763,7 +8755,7 @@
               </a:rPr>
               <a:t>Future Scope</a:t>
             </a:r>
-            <a:endParaRPr sz="1800">
+            <a:endParaRPr sz="1800" dirty="0">
               <a:solidFill>
                 <a:schemeClr val="dk1"/>
               </a:solidFill>
@@ -8954,7 +8946,7 @@
               </a:rPr>
               <a:t>ML 24/25-01 Investigate Image Reconstruction by using Classifiers</a:t>
             </a:r>
-            <a:endParaRPr lang="en" b="1">
+            <a:endParaRPr lang="en" b="1" dirty="0">
               <a:solidFill>
                 <a:schemeClr val="tx1"/>
               </a:solidFill>
@@ -9206,7 +9198,7 @@
               </a:rPr>
               <a:t>Hierarchical Temporal Memory (HTM) is a machine learning model inspired by the structure and function of the human neocortex. It is designed to learn patterns, recognize sequences, and generate generalized representations from similar inputs. At the core of HTM is the Spatial Pooler (SP), which transforms raw input data into Sparse Distributed Representations (SDRs). These SDRs efficiently capture and store patterns in the input, with each bit representing a specific feature or characteristic. This process is further enhanced by classifiers like HTM and KNN, which learn and then predict and reconstruct images based on the SDRs generated by the Spatial Pooler, allowing the system to assess the accuracy and efficiency of these methods for pattern recognition and image reconstruction tasks.</a:t>
             </a:r>
-            <a:endParaRPr lang="en-US" sz="1400">
+            <a:endParaRPr lang="en-US" sz="1400" dirty="0">
               <a:solidFill>
                 <a:schemeClr val="tx1"/>
               </a:solidFill>
@@ -9366,17 +9358,8 @@
               <a:rPr lang="en" sz="1600" b="1" dirty="0">
                 <a:cs typeface="Times New Roman"/>
               </a:rPr>
-              <a:t>Image </a:t>
+              <a:t>Image Binarizer</a:t>
             </a:r>
-            <a:r>
-              <a:rPr lang="en" sz="1600" b="1" err="1">
-                <a:cs typeface="Times New Roman"/>
-              </a:rPr>
-              <a:t>Binarizer</a:t>
-            </a:r>
-            <a:endParaRPr lang="en" sz="1600" b="1">
-              <a:cs typeface="Times New Roman"/>
-            </a:endParaRPr>
           </a:p>
           <a:p>
             <a:endParaRPr lang="en" dirty="0"/>
@@ -9385,25 +9368,17 @@
             <a:pPr algn="just"/>
             <a:r>
               <a:rPr lang="en" dirty="0"/>
-              <a:t>The Image </a:t>
-            </a:r>
-            <a:r>
-              <a:rPr lang="en" err="1"/>
-              <a:t>Binarizer</a:t>
-            </a:r>
-            <a:r>
-              <a:rPr lang="en" dirty="0"/>
-              <a:t> converts images into binary representations by thresholding RGB channels, resizing them to 64x64 pixels, and applying inversion for adaptability. It splits images into 80% training and 20% testing, saves binarized results, and maintains mappings to original images. The method returns structured data, enabling pattern recognition and classification tasks.</a:t>
+              <a:t>The Image Binarizer converts images into binary representations by thresholding RGB channels, resizing them to 64x64 pixels, and applying inversion for adaptability. It splits images into 80% training and 20% testing, saves binarized results, and maintains mappings to original images. The method returns structured data, enabling pattern recognition and classification tasks.</a:t>
             </a:r>
           </a:p>
         </p:txBody>
       </p:sp>
       <p:pic>
         <p:nvPicPr>
-          <p:cNvPr id="5" name="Picture 4">
+          <p:cNvPr id="10" name="Picture 9">
             <a:extLst>
               <a:ext uri="{FF2B5EF4-FFF2-40B4-BE49-F238E27FC236}">
-                <a16:creationId xmlns:a16="http://schemas.microsoft.com/office/drawing/2014/main" id="{665C089D-1135-5012-FD2F-657376CB1533}"/>
+                <a16:creationId xmlns:a16="http://schemas.microsoft.com/office/drawing/2014/main" id="{D8E36024-4756-2C67-0292-03E7F3A0576E}"/>
               </a:ext>
             </a:extLst>
           </p:cNvPr>
@@ -9414,13 +9389,14 @@
         </p:nvPicPr>
         <p:blipFill>
           <a:blip r:embed="rId2"/>
-          <a:srcRect t="906" r="121" b="129"/>
-          <a:stretch/>
+          <a:stretch>
+            <a:fillRect/>
+          </a:stretch>
         </p:blipFill>
         <p:spPr>
           <a:xfrm>
-            <a:off x="671358" y="3062748"/>
-            <a:ext cx="1081553" cy="1230271"/>
+            <a:off x="2595967" y="2900426"/>
+            <a:ext cx="1061806" cy="2072591"/>
           </a:xfrm>
           <a:prstGeom prst="rect">
             <a:avLst/>
@@ -9429,10 +9405,10 @@
       </p:pic>
       <p:pic>
         <p:nvPicPr>
-          <p:cNvPr id="6" name="Picture 5">
+          <p:cNvPr id="12" name="Picture 11">
             <a:extLst>
               <a:ext uri="{FF2B5EF4-FFF2-40B4-BE49-F238E27FC236}">
-                <a16:creationId xmlns:a16="http://schemas.microsoft.com/office/drawing/2014/main" id="{21B34612-1D62-47F2-19EC-B7177460DFF8}"/>
+                <a16:creationId xmlns:a16="http://schemas.microsoft.com/office/drawing/2014/main" id="{C09355F1-FF04-6850-56B2-D4AEF9C59724}"/>
               </a:ext>
             </a:extLst>
           </p:cNvPr>
@@ -9449,67 +9425,8 @@
         </p:blipFill>
         <p:spPr>
           <a:xfrm>
-            <a:off x="1941939" y="3064898"/>
-            <a:ext cx="913955" cy="1221353"/>
-          </a:xfrm>
-          <a:prstGeom prst="rect">
-            <a:avLst/>
-          </a:prstGeom>
-        </p:spPr>
-      </p:pic>
-      <p:pic>
-        <p:nvPicPr>
-          <p:cNvPr id="7" name="Picture 6">
-            <a:extLst>
-              <a:ext uri="{FF2B5EF4-FFF2-40B4-BE49-F238E27FC236}">
-                <a16:creationId xmlns:a16="http://schemas.microsoft.com/office/drawing/2014/main" id="{8127B0F7-D507-B61B-C762-5F4DD2E6F104}"/>
-              </a:ext>
-            </a:extLst>
-          </p:cNvPr>
-          <p:cNvPicPr>
-            <a:picLocks noChangeAspect="1"/>
-          </p:cNvPicPr>
-          <p:nvPr/>
-        </p:nvPicPr>
-        <p:blipFill>
-          <a:blip r:embed="rId4"/>
-          <a:srcRect l="13213" t="12634" r="11041" b="8816"/>
-          <a:stretch/>
-        </p:blipFill>
-        <p:spPr>
-          <a:xfrm>
-            <a:off x="4782507" y="3074116"/>
-            <a:ext cx="1164832" cy="1214946"/>
-          </a:xfrm>
-          <a:prstGeom prst="rect">
-            <a:avLst/>
-          </a:prstGeom>
-        </p:spPr>
-      </p:pic>
-      <p:pic>
-        <p:nvPicPr>
-          <p:cNvPr id="8" name="Picture 7">
-            <a:extLst>
-              <a:ext uri="{FF2B5EF4-FFF2-40B4-BE49-F238E27FC236}">
-                <a16:creationId xmlns:a16="http://schemas.microsoft.com/office/drawing/2014/main" id="{2D11C57F-B7E2-4A40-6E54-AD0901C89A6C}"/>
-              </a:ext>
-            </a:extLst>
-          </p:cNvPr>
-          <p:cNvPicPr>
-            <a:picLocks noChangeAspect="1"/>
-          </p:cNvPicPr>
-          <p:nvPr/>
-        </p:nvPicPr>
-        <p:blipFill>
-          <a:blip r:embed="rId5"/>
-          <a:stretch>
-            <a:fillRect/>
-          </a:stretch>
-        </p:blipFill>
-        <p:spPr>
-          <a:xfrm flipH="1">
-            <a:off x="6194790" y="3069508"/>
-            <a:ext cx="1077537" cy="1207523"/>
+            <a:off x="4207790" y="2900425"/>
+            <a:ext cx="1061805" cy="2072592"/>
           </a:xfrm>
           <a:prstGeom prst="rect">
             <a:avLst/>
@@ -10451,7 +10368,7 @@
               </a:rPr>
               <a:t> : HTM Classifiers performed better via predicting the Image with higher similarity. Also the classifier Prediction and Reconstruction time is being captured and the similarity between both the reconstructed images are presented.</a:t>
             </a:r>
-            <a:endParaRPr lang="en" sz="1400">
+            <a:endParaRPr lang="en" sz="1400" dirty="0">
               <a:solidFill>
                 <a:schemeClr val="tx1"/>
               </a:solidFill>
@@ -10500,7 +10417,7 @@
               </a:rPr>
               <a:t>: This is the scenario where both the HTM and KNN Classifiers predicted the same image. So we can say that here both the classifiers performed equally.</a:t>
             </a:r>
-            <a:endParaRPr lang="en">
+            <a:endParaRPr lang="en" dirty="0">
               <a:solidFill>
                 <a:schemeClr val="tx1"/>
               </a:solidFill>
@@ -10530,8 +10447,8 @@
         </p:blipFill>
         <p:spPr>
           <a:xfrm>
-            <a:off x="4670534" y="1218255"/>
-            <a:ext cx="4074401" cy="1647742"/>
+            <a:off x="4437656" y="1218254"/>
+            <a:ext cx="4307279" cy="1639663"/>
           </a:xfrm>
           <a:prstGeom prst="rect">
             <a:avLst/>
@@ -10540,10 +10457,10 @@
       </p:pic>
       <p:pic>
         <p:nvPicPr>
-          <p:cNvPr id="3" name="Picture 2">
+          <p:cNvPr id="5" name="Picture 4">
             <a:extLst>
               <a:ext uri="{FF2B5EF4-FFF2-40B4-BE49-F238E27FC236}">
-                <a16:creationId xmlns:a16="http://schemas.microsoft.com/office/drawing/2014/main" id="{C49C44B1-A853-25A7-1F72-57B18CFB27E9}"/>
+                <a16:creationId xmlns:a16="http://schemas.microsoft.com/office/drawing/2014/main" id="{999027A8-C155-FC2D-B90B-58D9FF5064DE}"/>
               </a:ext>
             </a:extLst>
           </p:cNvPr>
@@ -10553,15 +10470,15 @@
           <p:nvPr/>
         </p:nvPicPr>
         <p:blipFill>
-          <a:blip r:embed="rId3"/>
+          <a:blip r:embed="rId4"/>
           <a:stretch>
             <a:fillRect/>
           </a:stretch>
         </p:blipFill>
         <p:spPr>
           <a:xfrm>
-            <a:off x="4670535" y="3115043"/>
-            <a:ext cx="4079329" cy="1677305"/>
+            <a:off x="4437656" y="3223647"/>
+            <a:ext cx="4307279" cy="1551477"/>
           </a:xfrm>
           <a:prstGeom prst="rect">
             <a:avLst/>

</xml_diff>